<commit_message>
construct first table of  regulatory_status_summary table
</commit_message>
<xml_diff>
--- a/pptx/result/tmp.pptx
+++ b/pptx/result/tmp.pptx
@@ -3132,7 +3132,7 @@
         </p:nvGraphicFramePr>
         <p:xfrm>
           <a:off x="0" y="0"/>
-          <a:ext cx="1323000" cy="914400"/>
+          <a:ext cx="180000" cy="914400"/>
         </p:xfrm>
         <a:graphic>
           <a:graphicData uri="http://schemas.openxmlformats.org/drawingml/2006/table">
@@ -3141,13 +3141,15 @@
                 <a:tableStyleId>{5C22544A-7EE6-4342-B048-85BDC9FD1C3A}</a:tableStyleId>
               </a:tblPr>
               <a:tblGrid>
-                <a:gridCol w="852000"/>
-                <a:gridCol w="471000"/>
+                <a:gridCol w="90000"/>
+                <a:gridCol w="90000"/>
               </a:tblGrid>
               <a:tr h="457200">
                 <a:tc>
                   <a:txBody>
-                    <a:bodyPr/>
+                    <a:bodyPr>
+                      <a:normAutofit/>
+                    </a:bodyPr>
                     <a:lstStyle/>
                     <a:p>
                       <a:pPr>
@@ -3159,7 +3161,9 @@
                 </a:tc>
                 <a:tc>
                   <a:txBody>
-                    <a:bodyPr/>
+                    <a:bodyPr>
+                      <a:normAutofit/>
+                    </a:bodyPr>
                     <a:lstStyle/>
                     <a:p>
                       <a:pPr>
@@ -3176,7 +3180,9 @@
               <a:tr h="457200">
                 <a:tc>
                   <a:txBody>
-                    <a:bodyPr/>
+                    <a:bodyPr>
+                      <a:normAutofit/>
+                    </a:bodyPr>
                     <a:lstStyle/>
                     <a:p>
                       <a:pPr>
@@ -3191,12 +3197,58 @@
                 </a:tc>
                 <a:tc>
                   <a:txBody>
-                    <a:bodyPr/>
+                    <a:bodyPr>
+                      <a:normAutofit/>
+                    </a:bodyPr>
                     <a:lstStyle/>
                     <a:p>
                       <a:pPr>
                         <a:defRPr sz="1000"/>
                       </a:pPr>
+                      <a:r>
+                        <a:t>20</a:t>
+                      </a:r>
+                    </a:p>
+                    <a:p>
+                      <a:pPr>
+                        <a:defRPr sz="1000"/>
+                      </a:pPr>
+                      <a:r>
+                        <a:t>Mexico(IFETEL),Brazil(ANATEL)
+</a:t>
+                      </a:r>
+                      <a:r>
+                        <a:t>,Ukraine(TEC+NSoC+RoHS)
+</a:t>
+                      </a:r>
+                      <a:r>
+                        <a:t>,Ecuador(ARCOTEL),Nigeria(NCC)
+</a:t>
+                      </a:r>
+                      <a:r>
+                        <a:t>,Morocco(ANRT),Azerbaijan(ARRVITN)
+</a:t>
+                      </a:r>
+                      <a:r>
+                        <a:t>,Argentina(ENACOM),Chile(SUBTEL)
+</a:t>
+                      </a:r>
+                      <a:r>
+                        <a:t>,Uzbekistan(Uzbek),Zambia(ZICTA)
+</a:t>
+                      </a:r>
+                      <a:r>
+                        <a:t>,India(BIS),Serbia(Kvatet)
+</a:t>
+                      </a:r>
+                      <a:r>
+                        <a:t>,Moldova(INSM),South Africa(NRCS)
+</a:t>
+                      </a:r>
+                      <a:r>
+                        <a:t>,Armenia/Belarus/Kazakhstan/Russian/Kyrgyzstan(CU)
+</a:t>
+                      </a:r>
                     </a:p>
                   </a:txBody>
                   <a:tcPr/>

</xml_diff>

<commit_message>
add functions to PPTX_FEATURE
</commit_message>
<xml_diff>
--- a/pptx/result/tmp.pptx
+++ b/pptx/result/tmp.pptx
@@ -3132,7 +3132,7 @@
         </p:nvGraphicFramePr>
         <p:xfrm>
           <a:off x="0" y="0"/>
-          <a:ext cx="180000" cy="914400"/>
+          <a:ext cx="7419000" cy="914400"/>
         </p:xfrm>
         <a:graphic>
           <a:graphicData uri="http://schemas.openxmlformats.org/drawingml/2006/table">
@@ -3141,15 +3141,13 @@
                 <a:tableStyleId>{5C22544A-7EE6-4342-B048-85BDC9FD1C3A}</a:tableStyleId>
               </a:tblPr>
               <a:tblGrid>
-                <a:gridCol w="90000"/>
-                <a:gridCol w="90000"/>
+                <a:gridCol w="852000"/>
+                <a:gridCol w="6567000"/>
               </a:tblGrid>
               <a:tr h="457200">
                 <a:tc>
                   <a:txBody>
-                    <a:bodyPr>
-                      <a:normAutofit/>
-                    </a:bodyPr>
+                    <a:bodyPr/>
                     <a:lstStyle/>
                     <a:p>
                       <a:pPr>
@@ -3161,9 +3159,7 @@
                 </a:tc>
                 <a:tc>
                   <a:txBody>
-                    <a:bodyPr>
-                      <a:normAutofit/>
-                    </a:bodyPr>
+                    <a:bodyPr/>
                     <a:lstStyle/>
                     <a:p>
                       <a:pPr>
@@ -3180,9 +3176,7 @@
               <a:tr h="457200">
                 <a:tc>
                   <a:txBody>
-                    <a:bodyPr>
-                      <a:normAutofit/>
-                    </a:bodyPr>
+                    <a:bodyPr/>
                     <a:lstStyle/>
                     <a:p>
                       <a:pPr>
@@ -3197,9 +3191,7 @@
                 </a:tc>
                 <a:tc>
                   <a:txBody>
-                    <a:bodyPr>
-                      <a:normAutofit/>
-                    </a:bodyPr>
+                    <a:bodyPr/>
                     <a:lstStyle/>
                     <a:p>
                       <a:pPr>

</xml_diff>

<commit_message>
dev set_table_border via xml
</commit_message>
<xml_diff>
--- a/pptx/result/tmp.pptx
+++ b/pptx/result/tmp.pptx
@@ -3155,7 +3155,16 @@
                       </a:pPr>
                     </a:p>
                   </a:txBody>
-                  <a:tcPr anchor="ctr"/>
+                  <a:tcPr anchor="ctr">
+                    <a:solidFill>
+                      <a:srgbClr val="0085C3"/>
+                    </a:solidFill>
+                    <a:lnR w="12700" cap="flat" cmpd="sng" algn="ctr">
+                      <a:solidFill>
+                        <a:srgbClr val="000000"/>
+                      </a:solidFill>
+                    </a:lnR>
+                  </a:tcPr>
                 </a:tc>
                 <a:tc>
                   <a:txBody>
@@ -3170,7 +3179,16 @@
                       </a:r>
                     </a:p>
                   </a:txBody>
-                  <a:tcPr anchor="ctr"/>
+                  <a:tcPr anchor="ctr">
+                    <a:solidFill>
+                      <a:srgbClr val="0085C3"/>
+                    </a:solidFill>
+                    <a:lnR w="12700" cap="flat" cmpd="sng" algn="ctr">
+                      <a:solidFill>
+                        <a:srgbClr val="000000"/>
+                      </a:solidFill>
+                    </a:lnR>
+                  </a:tcPr>
                 </a:tc>
               </a:tr>
               <a:tr h="457200">
@@ -3187,7 +3205,16 @@
                       </a:r>
                     </a:p>
                   </a:txBody>
-                  <a:tcPr anchor="ctr"/>
+                  <a:tcPr anchor="ctr">
+                    <a:solidFill>
+                      <a:srgbClr val="FFFFFF"/>
+                    </a:solidFill>
+                    <a:lnR w="12700" cap="flat" cmpd="sng" algn="ctr">
+                      <a:solidFill>
+                        <a:srgbClr val="000000"/>
+                      </a:solidFill>
+                    </a:lnR>
+                  </a:tcPr>
                 </a:tc>
                 <a:tc>
                   <a:txBody>
@@ -3243,7 +3270,217 @@
                       </a:r>
                     </a:p>
                   </a:txBody>
-                  <a:tcPr anchor="ctr"/>
+                  <a:tcPr anchor="ctr">
+                    <a:solidFill>
+                      <a:srgbClr val="FFFFFF"/>
+                    </a:solidFill>
+                    <a:lnR w="12700" cap="flat" cmpd="sng" algn="ctr">
+                      <a:solidFill>
+                        <a:srgbClr val="000000"/>
+                      </a:solidFill>
+                    </a:lnR>
+                  </a:tcPr>
+                </a:tc>
+              </a:tr>
+            </a:tbl>
+          </a:graphicData>
+        </a:graphic>
+      </p:graphicFrame>
+      <p:graphicFrame>
+        <p:nvGraphicFramePr>
+          <p:cNvPr id="5" name="Table 4"/>
+          <p:cNvGraphicFramePr>
+            <a:graphicFrameLocks noGrp="1"/>
+          </p:cNvGraphicFramePr>
+          <p:nvPr/>
+        </p:nvGraphicFramePr>
+        <p:xfrm>
+          <a:off x="0" y="3200400"/>
+          <a:ext cx="5768000" cy="914400"/>
+        </p:xfrm>
+        <a:graphic>
+          <a:graphicData uri="http://schemas.openxmlformats.org/drawingml/2006/table">
+            <a:tbl>
+              <a:tblPr firstRow="1" bandRow="1">
+                <a:tableStyleId>{5C22544A-7EE6-4342-B048-85BDC9FD1C3A}</a:tableStyleId>
+              </a:tblPr>
+              <a:tblGrid>
+                <a:gridCol w="852000"/>
+                <a:gridCol w="4916000"/>
+              </a:tblGrid>
+              <a:tr h="304800">
+                <a:tc>
+                  <a:txBody>
+                    <a:bodyPr/>
+                    <a:lstStyle/>
+                    <a:p>
+                      <a:pPr algn="ctr">
+                        <a:defRPr sz="1000"/>
+                      </a:pPr>
+                    </a:p>
+                  </a:txBody>
+                  <a:tcPr anchor="ctr">
+                    <a:solidFill>
+                      <a:srgbClr val="0085C3"/>
+                    </a:solidFill>
+                  </a:tcPr>
+                </a:tc>
+                <a:tc>
+                  <a:txBody>
+                    <a:bodyPr/>
+                    <a:lstStyle/>
+                    <a:p>
+                      <a:pPr algn="ctr">
+                        <a:defRPr sz="1000"/>
+                      </a:pPr>
+                      <a:r>
+                        <a:t>PPE</a:t>
+                      </a:r>
+                    </a:p>
+                  </a:txBody>
+                  <a:tcPr anchor="ctr">
+                    <a:solidFill>
+                      <a:srgbClr val="0085C3"/>
+                    </a:solidFill>
+                  </a:tcPr>
+                </a:tc>
+              </a:tr>
+              <a:tr h="304800">
+                <a:tc>
+                  <a:txBody>
+                    <a:bodyPr/>
+                    <a:lstStyle/>
+                    <a:p>
+                      <a:pPr algn="ctr">
+                        <a:defRPr sz="1000"/>
+                      </a:pPr>
+                      <a:r>
+                        <a:t>(WWAN)</a:t>
+                      </a:r>
+                    </a:p>
+                  </a:txBody>
+                  <a:tcPr anchor="ctr">
+                    <a:solidFill>
+                      <a:srgbClr val="FFFFFF"/>
+                    </a:solidFill>
+                  </a:tcPr>
+                </a:tc>
+                <a:tc>
+                  <a:txBody>
+                    <a:bodyPr/>
+                    <a:lstStyle/>
+                    <a:p>
+                      <a:pPr algn="ctr">
+                        <a:defRPr sz="1000"/>
+                      </a:pPr>
+                      <a:r>
+                        <a:t>6</a:t>
+                      </a:r>
+                    </a:p>
+                    <a:p>
+                      <a:pPr algn="ctr">
+                        <a:defRPr sz="1000"/>
+                      </a:pPr>
+                      <a:r>
+                        <a:t>Jordan(TRC (RTN)),China(NAL)
+</a:t>
+                      </a:r>
+                      <a:r>
+                        <a:t>,Saudi Arabia(CITC),Taiwan(NCC)
+</a:t>
+                      </a:r>
+                      <a:r>
+                        <a:t>,Philippines(NTC),Thailand(Class B)
+</a:t>
+                      </a:r>
+                    </a:p>
+                  </a:txBody>
+                  <a:tcPr anchor="ctr">
+                    <a:solidFill>
+                      <a:srgbClr val="FFFFFF"/>
+                    </a:solidFill>
+                  </a:tcPr>
+                </a:tc>
+              </a:tr>
+              <a:tr h="304800">
+                <a:tc>
+                  <a:txBody>
+                    <a:bodyPr/>
+                    <a:lstStyle/>
+                    <a:p>
+                      <a:pPr algn="ctr">
+                        <a:defRPr sz="1000"/>
+                      </a:pPr>
+                      <a:r>
+                        <a:t>RFID</a:t>
+                      </a:r>
+                    </a:p>
+                  </a:txBody>
+                  <a:tcPr anchor="ctr">
+                    <a:solidFill>
+                      <a:srgbClr val="FFFFFF"/>
+                    </a:solidFill>
+                  </a:tcPr>
+                </a:tc>
+                <a:tc>
+                  <a:txBody>
+                    <a:bodyPr/>
+                    <a:lstStyle/>
+                    <a:p>
+                      <a:pPr algn="ctr">
+                        <a:defRPr sz="1000"/>
+                      </a:pPr>
+                      <a:r>
+                        <a:t>17</a:t>
+                      </a:r>
+                    </a:p>
+                    <a:p>
+                      <a:pPr algn="ctr">
+                        <a:defRPr sz="1000"/>
+                      </a:pPr>
+                      <a:r>
+                        <a:t>Lebanon(TRA/MoT),India(DoT (China))
+</a:t>
+                      </a:r>
+                      <a:r>
+                        <a:t>,Guyana(PUC),Mexico(IFETEL)
+</a:t>
+                      </a:r>
+                      <a:r>
+                        <a:t>,Saint Lucia(NTRC),Moldova(DoC)
+</a:t>
+                      </a:r>
+                      <a:r>
+                        <a:t>,Nicaragua(TELCOR),Zimbabwe(POTRAZ)
+</a:t>
+                      </a:r>
+                      <a:r>
+                        <a:t>,Cambodia(MPTC),Argentina(ENACOM)
+</a:t>
+                      </a:r>
+                      <a:r>
+                        <a:t>,Dominican Republic(INDOTEL)
+</a:t>
+                      </a:r>
+                      <a:r>
+                        <a:t>,South Africa(ICASA)
+</a:t>
+                      </a:r>
+                      <a:r>
+                        <a:t>,Haiti(CONATEL),Solomon Islands(TCSI)
+</a:t>
+                      </a:r>
+                      <a:r>
+                        <a:t>,Bahamas(URCA),Paraguay(CONATEL)
+</a:t>
+                      </a:r>
+                    </a:p>
+                  </a:txBody>
+                  <a:tcPr anchor="ctr">
+                    <a:solidFill>
+                      <a:srgbClr val="FFFFFF"/>
+                    </a:solidFill>
+                  </a:tcPr>
                 </a:tc>
               </a:tr>
             </a:tbl>

</xml_diff>

<commit_message>
new table style function about text size
</commit_message>
<xml_diff>
--- a/pptx/result/tmp.pptx
+++ b/pptx/result/tmp.pptx
@@ -3132,7 +3132,7 @@
         </p:nvGraphicFramePr>
         <p:xfrm>
           <a:off x="0" y="0"/>
-          <a:ext cx="458470" cy="914400"/>
+          <a:ext cx="3886200" cy="914400"/>
         </p:xfrm>
         <a:graphic>
           <a:graphicData uri="http://schemas.openxmlformats.org/drawingml/2006/table">
@@ -3141,8 +3141,8 @@
                 <a:tableStyleId>{5C22544A-7EE6-4342-B048-85BDC9FD1C3A}</a:tableStyleId>
               </a:tblPr>
               <a:tblGrid>
-                <a:gridCol w="457200"/>
-                <a:gridCol w="1270"/>
+                <a:gridCol w="838200"/>
+                <a:gridCol w="3048000"/>
               </a:tblGrid>
               <a:tr h="457200">
                 <a:tc>
@@ -3150,7 +3150,9 @@
                     <a:bodyPr/>
                     <a:lstStyle/>
                     <a:p>
-                      <a:pPr algn="ctr"/>
+                      <a:pPr algn="ctr">
+                        <a:defRPr sz="1000"/>
+                      </a:pPr>
                     </a:p>
                   </a:txBody>
                   <a:tcPr anchor="ctr">
@@ -3188,7 +3190,9 @@
                     <a:bodyPr/>
                     <a:lstStyle/>
                     <a:p>
-                      <a:pPr algn="ctr"/>
+                      <a:pPr algn="ctr">
+                        <a:defRPr sz="1000"/>
+                      </a:pPr>
                       <a:r>
                         <a:t>PPE</a:t>
                       </a:r>
@@ -3231,7 +3235,9 @@
                     <a:bodyPr/>
                     <a:lstStyle/>
                     <a:p>
-                      <a:pPr algn="ctr"/>
+                      <a:pPr algn="ctr">
+                        <a:defRPr sz="1000"/>
+                      </a:pPr>
                       <a:r>
                         <a:t>System</a:t>
                       </a:r>
@@ -3272,15 +3278,52 @@
                     <a:bodyPr/>
                     <a:lstStyle/>
                     <a:p>
-                      <a:pPr algn="ctr"/>
+                      <a:pPr algn="ctr">
+                        <a:defRPr sz="1000"/>
+                      </a:pPr>
                       <a:r>
                         <a:t>20</a:t>
                       </a:r>
                     </a:p>
                     <a:p>
-                      <a:pPr algn="ctr"/>
+                      <a:pPr algn="ctr">
+                        <a:defRPr sz="1000"/>
+                      </a:pPr>
                       <a:r>
-                        <a:t>Mexico(IFETEL),Brazil(ANATEL),Ukraine(TEC+NSoC+RoHS),Ecuador(ARCOTEL),Nigeria(NCC),Morocco(ANRT),Azerbaijan(ARRVITN),Argentina(ENACOM),Chile(SUBTEL),Uzbekistan(Uzbek),Zambia(ZICTA),India(BIS),Serbia(Kvatet),Moldova(INSM),South Africa(NRCS),Armenia/Belarus/Kazakhstan/Russian/Kyrgyzstan(CU)</a:t>
+                        <a:t>Mexico(IFETEL),Brazil(ANATEL)
+</a:t>
+                      </a:r>
+                      <a:r>
+                        <a:t>,Ukraine(TEC+NSoC+RoHS)
+</a:t>
+                      </a:r>
+                      <a:r>
+                        <a:t>,Ecuador(ARCOTEL),Nigeria(NCC)
+</a:t>
+                      </a:r>
+                      <a:r>
+                        <a:t>,Morocco(ANRT),Azerbaijan(ARRVITN)
+</a:t>
+                      </a:r>
+                      <a:r>
+                        <a:t>,Argentina(ENACOM),Chile(SUBTEL)
+</a:t>
+                      </a:r>
+                      <a:r>
+                        <a:t>,Uzbekistan(Uzbek),Zambia(ZICTA)
+</a:t>
+                      </a:r>
+                      <a:r>
+                        <a:t>,India(BIS),Serbia(Kvatet)
+</a:t>
+                      </a:r>
+                      <a:r>
+                        <a:t>,Moldova(INSM),South Africa(NRCS)
+</a:t>
+                      </a:r>
+                      <a:r>
+                        <a:t>,Armenia/Belarus/Kazakhstan/Russian/Kyrgyzstan(CU)
+</a:t>
                       </a:r>
                     </a:p>
                   </a:txBody>
@@ -3329,7 +3372,7 @@
         </p:nvGraphicFramePr>
         <p:xfrm>
           <a:off x="0" y="3200400"/>
-          <a:ext cx="914400" cy="914400"/>
+          <a:ext cx="3886200" cy="914400"/>
         </p:xfrm>
         <a:graphic>
           <a:graphicData uri="http://schemas.openxmlformats.org/drawingml/2006/table">
@@ -3338,8 +3381,8 @@
                 <a:tableStyleId>{5C22544A-7EE6-4342-B048-85BDC9FD1C3A}</a:tableStyleId>
               </a:tblPr>
               <a:tblGrid>
-                <a:gridCol w="457200"/>
-                <a:gridCol w="457200"/>
+                <a:gridCol w="838200"/>
+                <a:gridCol w="3048000"/>
               </a:tblGrid>
               <a:tr h="304800">
                 <a:tc>
@@ -3347,7 +3390,9 @@
                     <a:bodyPr/>
                     <a:lstStyle/>
                     <a:p>
-                      <a:pPr algn="ctr"/>
+                      <a:pPr algn="ctr">
+                        <a:defRPr sz="1000"/>
+                      </a:pPr>
                     </a:p>
                   </a:txBody>
                   <a:tcPr anchor="ctr">
@@ -3385,7 +3430,9 @@
                     <a:bodyPr/>
                     <a:lstStyle/>
                     <a:p>
-                      <a:pPr algn="ctr"/>
+                      <a:pPr algn="ctr">
+                        <a:defRPr sz="1000"/>
+                      </a:pPr>
                       <a:r>
                         <a:t>PPE</a:t>
                       </a:r>
@@ -3428,7 +3475,9 @@
                     <a:bodyPr/>
                     <a:lstStyle/>
                     <a:p>
-                      <a:pPr algn="ctr"/>
+                      <a:pPr algn="ctr">
+                        <a:defRPr sz="1000"/>
+                      </a:pPr>
                       <a:r>
                         <a:t>(WWAN)</a:t>
                       </a:r>
@@ -3469,13 +3518,17 @@
                     <a:bodyPr/>
                     <a:lstStyle/>
                     <a:p>
-                      <a:pPr algn="ctr"/>
+                      <a:pPr algn="ctr">
+                        <a:defRPr sz="1000"/>
+                      </a:pPr>
                       <a:r>
                         <a:t>6</a:t>
                       </a:r>
                     </a:p>
                     <a:p>
-                      <a:pPr algn="ctr"/>
+                      <a:pPr algn="ctr">
+                        <a:defRPr sz="1000"/>
+                      </a:pPr>
                       <a:r>
                         <a:t>Jordan(TRC (RTN)),China(NAL)
 </a:t>
@@ -3527,7 +3580,9 @@
                     <a:bodyPr/>
                     <a:lstStyle/>
                     <a:p>
-                      <a:pPr algn="ctr"/>
+                      <a:pPr algn="ctr">
+                        <a:defRPr sz="1000"/>
+                      </a:pPr>
                       <a:r>
                         <a:t>RFID</a:t>
                       </a:r>
@@ -3568,13 +3623,17 @@
                     <a:bodyPr/>
                     <a:lstStyle/>
                     <a:p>
-                      <a:pPr algn="ctr"/>
+                      <a:pPr algn="ctr">
+                        <a:defRPr sz="1000"/>
+                      </a:pPr>
                       <a:r>
                         <a:t>17</a:t>
                       </a:r>
                     </a:p>
                     <a:p>
-                      <a:pPr algn="ctr"/>
+                      <a:pPr algn="ctr">
+                        <a:defRPr sz="1000"/>
+                      </a:pPr>
                       <a:r>
                         <a:t>Lebanon(TRA/MoT),India(DoT (China))
 </a:t>

</xml_diff>

<commit_message>
update code "the border must be set before the fill, or the xml would be overide"
</commit_message>
<xml_diff>
--- a/pptx/result/tmp.pptx
+++ b/pptx/result/tmp.pptx
@@ -3164,24 +3164,36 @@
                         <a:srgbClr val="444444"/>
                       </a:solidFill>
                       <a:prstDash val="solid"/>
+                      <a:round/>
+                      <a:headEnd type="none" w="med" len="med"/>
+                      <a:tailEnd type="none" w="med" len="med"/>
                     </a:lnL>
                     <a:lnR w="12700" cap="flat" cmpd="sng" algn="ctr">
                       <a:solidFill>
                         <a:srgbClr val="444444"/>
                       </a:solidFill>
                       <a:prstDash val="solid"/>
+                      <a:round/>
+                      <a:headEnd type="none" w="med" len="med"/>
+                      <a:tailEnd type="none" w="med" len="med"/>
                     </a:lnR>
                     <a:lnT w="12700" cap="flat" cmpd="sng" algn="ctr">
                       <a:solidFill>
                         <a:srgbClr val="444444"/>
                       </a:solidFill>
                       <a:prstDash val="solid"/>
+                      <a:round/>
+                      <a:headEnd type="none" w="med" len="med"/>
+                      <a:tailEnd type="none" w="med" len="med"/>
                     </a:lnT>
                     <a:lnB w="12700" cap="flat" cmpd="sng" algn="ctr">
                       <a:solidFill>
                         <a:srgbClr val="444444"/>
                       </a:solidFill>
                       <a:prstDash val="solid"/>
+                      <a:round/>
+                      <a:headEnd type="none" w="med" len="med"/>
+                      <a:tailEnd type="none" w="med" len="med"/>
                     </a:lnB>
                   </a:tcPr>
                 </a:tc>
@@ -3207,24 +3219,36 @@
                         <a:srgbClr val="444444"/>
                       </a:solidFill>
                       <a:prstDash val="solid"/>
+                      <a:round/>
+                      <a:headEnd type="none" w="med" len="med"/>
+                      <a:tailEnd type="none" w="med" len="med"/>
                     </a:lnL>
                     <a:lnR w="12700" cap="flat" cmpd="sng" algn="ctr">
                       <a:solidFill>
                         <a:srgbClr val="444444"/>
                       </a:solidFill>
                       <a:prstDash val="solid"/>
+                      <a:round/>
+                      <a:headEnd type="none" w="med" len="med"/>
+                      <a:tailEnd type="none" w="med" len="med"/>
                     </a:lnR>
                     <a:lnT w="12700" cap="flat" cmpd="sng" algn="ctr">
                       <a:solidFill>
                         <a:srgbClr val="444444"/>
                       </a:solidFill>
                       <a:prstDash val="solid"/>
+                      <a:round/>
+                      <a:headEnd type="none" w="med" len="med"/>
+                      <a:tailEnd type="none" w="med" len="med"/>
                     </a:lnT>
                     <a:lnB w="12700" cap="flat" cmpd="sng" algn="ctr">
                       <a:solidFill>
                         <a:srgbClr val="444444"/>
                       </a:solidFill>
                       <a:prstDash val="solid"/>
+                      <a:round/>
+                      <a:headEnd type="none" w="med" len="med"/>
+                      <a:tailEnd type="none" w="med" len="med"/>
                     </a:lnB>
                   </a:tcPr>
                 </a:tc>
@@ -3252,24 +3276,36 @@
                         <a:srgbClr val="444444"/>
                       </a:solidFill>
                       <a:prstDash val="solid"/>
+                      <a:round/>
+                      <a:headEnd type="none" w="med" len="med"/>
+                      <a:tailEnd type="none" w="med" len="med"/>
                     </a:lnL>
                     <a:lnR w="12700" cap="flat" cmpd="sng" algn="ctr">
                       <a:solidFill>
                         <a:srgbClr val="444444"/>
                       </a:solidFill>
                       <a:prstDash val="solid"/>
+                      <a:round/>
+                      <a:headEnd type="none" w="med" len="med"/>
+                      <a:tailEnd type="none" w="med" len="med"/>
                     </a:lnR>
                     <a:lnT w="12700" cap="flat" cmpd="sng" algn="ctr">
                       <a:solidFill>
                         <a:srgbClr val="444444"/>
                       </a:solidFill>
                       <a:prstDash val="solid"/>
+                      <a:round/>
+                      <a:headEnd type="none" w="med" len="med"/>
+                      <a:tailEnd type="none" w="med" len="med"/>
                     </a:lnT>
                     <a:lnB w="12700" cap="flat" cmpd="sng" algn="ctr">
                       <a:solidFill>
                         <a:srgbClr val="444444"/>
                       </a:solidFill>
                       <a:prstDash val="solid"/>
+                      <a:round/>
+                      <a:headEnd type="none" w="med" len="med"/>
+                      <a:tailEnd type="none" w="med" len="med"/>
                     </a:lnB>
                   </a:tcPr>
                 </a:tc>
@@ -3336,24 +3372,36 @@
                         <a:srgbClr val="444444"/>
                       </a:solidFill>
                       <a:prstDash val="solid"/>
+                      <a:round/>
+                      <a:headEnd type="none" w="med" len="med"/>
+                      <a:tailEnd type="none" w="med" len="med"/>
                     </a:lnL>
                     <a:lnR w="12700" cap="flat" cmpd="sng" algn="ctr">
                       <a:solidFill>
                         <a:srgbClr val="444444"/>
                       </a:solidFill>
                       <a:prstDash val="solid"/>
+                      <a:round/>
+                      <a:headEnd type="none" w="med" len="med"/>
+                      <a:tailEnd type="none" w="med" len="med"/>
                     </a:lnR>
                     <a:lnT w="12700" cap="flat" cmpd="sng" algn="ctr">
                       <a:solidFill>
                         <a:srgbClr val="444444"/>
                       </a:solidFill>
                       <a:prstDash val="solid"/>
+                      <a:round/>
+                      <a:headEnd type="none" w="med" len="med"/>
+                      <a:tailEnd type="none" w="med" len="med"/>
                     </a:lnT>
                     <a:lnB w="12700" cap="flat" cmpd="sng" algn="ctr">
                       <a:solidFill>
                         <a:srgbClr val="444444"/>
                       </a:solidFill>
                       <a:prstDash val="solid"/>
+                      <a:round/>
+                      <a:headEnd type="none" w="med" len="med"/>
+                      <a:tailEnd type="none" w="med" len="med"/>
                     </a:lnB>
                   </a:tcPr>
                 </a:tc>
@@ -3396,33 +3444,45 @@
                     </a:p>
                   </a:txBody>
                   <a:tcPr anchor="ctr">
-                    <a:solidFill>
-                      <a:srgbClr val="0085C3"/>
-                    </a:solidFill>
                     <a:lnL w="12700" cap="flat" cmpd="sng" algn="ctr">
                       <a:solidFill>
                         <a:srgbClr val="444444"/>
                       </a:solidFill>
                       <a:prstDash val="solid"/>
+                      <a:round/>
+                      <a:headEnd type="none" w="med" len="med"/>
+                      <a:tailEnd type="none" w="med" len="med"/>
                     </a:lnL>
                     <a:lnR w="12700" cap="flat" cmpd="sng" algn="ctr">
                       <a:solidFill>
                         <a:srgbClr val="444444"/>
                       </a:solidFill>
                       <a:prstDash val="solid"/>
+                      <a:round/>
+                      <a:headEnd type="none" w="med" len="med"/>
+                      <a:tailEnd type="none" w="med" len="med"/>
                     </a:lnR>
                     <a:lnT w="12700" cap="flat" cmpd="sng" algn="ctr">
                       <a:solidFill>
                         <a:srgbClr val="444444"/>
                       </a:solidFill>
                       <a:prstDash val="solid"/>
+                      <a:round/>
+                      <a:headEnd type="none" w="med" len="med"/>
+                      <a:tailEnd type="none" w="med" len="med"/>
                     </a:lnT>
                     <a:lnB w="12700" cap="flat" cmpd="sng" algn="ctr">
                       <a:solidFill>
                         <a:srgbClr val="444444"/>
                       </a:solidFill>
                       <a:prstDash val="solid"/>
+                      <a:round/>
+                      <a:headEnd type="none" w="med" len="med"/>
+                      <a:tailEnd type="none" w="med" len="med"/>
                     </a:lnB>
+                    <a:solidFill>
+                      <a:srgbClr val="0085C3"/>
+                    </a:solidFill>
                   </a:tcPr>
                 </a:tc>
                 <a:tc>
@@ -3439,33 +3499,45 @@
                     </a:p>
                   </a:txBody>
                   <a:tcPr anchor="ctr">
-                    <a:solidFill>
-                      <a:srgbClr val="0085C3"/>
-                    </a:solidFill>
                     <a:lnL w="12700" cap="flat" cmpd="sng" algn="ctr">
                       <a:solidFill>
                         <a:srgbClr val="444444"/>
                       </a:solidFill>
                       <a:prstDash val="solid"/>
+                      <a:round/>
+                      <a:headEnd type="none" w="med" len="med"/>
+                      <a:tailEnd type="none" w="med" len="med"/>
                     </a:lnL>
                     <a:lnR w="12700" cap="flat" cmpd="sng" algn="ctr">
                       <a:solidFill>
                         <a:srgbClr val="444444"/>
                       </a:solidFill>
                       <a:prstDash val="solid"/>
+                      <a:round/>
+                      <a:headEnd type="none" w="med" len="med"/>
+                      <a:tailEnd type="none" w="med" len="med"/>
                     </a:lnR>
                     <a:lnT w="12700" cap="flat" cmpd="sng" algn="ctr">
                       <a:solidFill>
                         <a:srgbClr val="444444"/>
                       </a:solidFill>
                       <a:prstDash val="solid"/>
+                      <a:round/>
+                      <a:headEnd type="none" w="med" len="med"/>
+                      <a:tailEnd type="none" w="med" len="med"/>
                     </a:lnT>
                     <a:lnB w="12700" cap="flat" cmpd="sng" algn="ctr">
                       <a:solidFill>
                         <a:srgbClr val="444444"/>
                       </a:solidFill>
                       <a:prstDash val="solid"/>
+                      <a:round/>
+                      <a:headEnd type="none" w="med" len="med"/>
+                      <a:tailEnd type="none" w="med" len="med"/>
                     </a:lnB>
+                    <a:solidFill>
+                      <a:srgbClr val="0085C3"/>
+                    </a:solidFill>
                   </a:tcPr>
                 </a:tc>
               </a:tr>
@@ -3484,33 +3556,45 @@
                     </a:p>
                   </a:txBody>
                   <a:tcPr anchor="ctr">
-                    <a:solidFill>
-                      <a:srgbClr val="FFFFFF"/>
-                    </a:solidFill>
                     <a:lnL w="12700" cap="flat" cmpd="sng" algn="ctr">
                       <a:solidFill>
                         <a:srgbClr val="444444"/>
                       </a:solidFill>
                       <a:prstDash val="solid"/>
+                      <a:round/>
+                      <a:headEnd type="none" w="med" len="med"/>
+                      <a:tailEnd type="none" w="med" len="med"/>
                     </a:lnL>
                     <a:lnR w="12700" cap="flat" cmpd="sng" algn="ctr">
                       <a:solidFill>
                         <a:srgbClr val="444444"/>
                       </a:solidFill>
                       <a:prstDash val="solid"/>
+                      <a:round/>
+                      <a:headEnd type="none" w="med" len="med"/>
+                      <a:tailEnd type="none" w="med" len="med"/>
                     </a:lnR>
                     <a:lnT w="12700" cap="flat" cmpd="sng" algn="ctr">
                       <a:solidFill>
                         <a:srgbClr val="444444"/>
                       </a:solidFill>
                       <a:prstDash val="solid"/>
+                      <a:round/>
+                      <a:headEnd type="none" w="med" len="med"/>
+                      <a:tailEnd type="none" w="med" len="med"/>
                     </a:lnT>
                     <a:lnB w="12700" cap="flat" cmpd="sng" algn="ctr">
                       <a:solidFill>
                         <a:srgbClr val="444444"/>
                       </a:solidFill>
                       <a:prstDash val="solid"/>
+                      <a:round/>
+                      <a:headEnd type="none" w="med" len="med"/>
+                      <a:tailEnd type="none" w="med" len="med"/>
                     </a:lnB>
+                    <a:solidFill>
+                      <a:srgbClr val="FFFFFF"/>
+                    </a:solidFill>
                   </a:tcPr>
                 </a:tc>
                 <a:tc>
@@ -3544,33 +3628,45 @@
                     </a:p>
                   </a:txBody>
                   <a:tcPr anchor="ctr">
-                    <a:solidFill>
-                      <a:srgbClr val="FFFFFF"/>
-                    </a:solidFill>
                     <a:lnL w="12700" cap="flat" cmpd="sng" algn="ctr">
                       <a:solidFill>
                         <a:srgbClr val="444444"/>
                       </a:solidFill>
                       <a:prstDash val="solid"/>
+                      <a:round/>
+                      <a:headEnd type="none" w="med" len="med"/>
+                      <a:tailEnd type="none" w="med" len="med"/>
                     </a:lnL>
                     <a:lnR w="12700" cap="flat" cmpd="sng" algn="ctr">
                       <a:solidFill>
                         <a:srgbClr val="444444"/>
                       </a:solidFill>
                       <a:prstDash val="solid"/>
+                      <a:round/>
+                      <a:headEnd type="none" w="med" len="med"/>
+                      <a:tailEnd type="none" w="med" len="med"/>
                     </a:lnR>
                     <a:lnT w="12700" cap="flat" cmpd="sng" algn="ctr">
                       <a:solidFill>
                         <a:srgbClr val="444444"/>
                       </a:solidFill>
                       <a:prstDash val="solid"/>
+                      <a:round/>
+                      <a:headEnd type="none" w="med" len="med"/>
+                      <a:tailEnd type="none" w="med" len="med"/>
                     </a:lnT>
                     <a:lnB w="12700" cap="flat" cmpd="sng" algn="ctr">
                       <a:solidFill>
                         <a:srgbClr val="444444"/>
                       </a:solidFill>
                       <a:prstDash val="solid"/>
+                      <a:round/>
+                      <a:headEnd type="none" w="med" len="med"/>
+                      <a:tailEnd type="none" w="med" len="med"/>
                     </a:lnB>
+                    <a:solidFill>
+                      <a:srgbClr val="FFFFFF"/>
+                    </a:solidFill>
                   </a:tcPr>
                 </a:tc>
               </a:tr>
@@ -3589,33 +3685,45 @@
                     </a:p>
                   </a:txBody>
                   <a:tcPr anchor="ctr">
-                    <a:solidFill>
-                      <a:srgbClr val="FFFFFF"/>
-                    </a:solidFill>
                     <a:lnL w="12700" cap="flat" cmpd="sng" algn="ctr">
                       <a:solidFill>
                         <a:srgbClr val="444444"/>
                       </a:solidFill>
                       <a:prstDash val="solid"/>
+                      <a:round/>
+                      <a:headEnd type="none" w="med" len="med"/>
+                      <a:tailEnd type="none" w="med" len="med"/>
                     </a:lnL>
                     <a:lnR w="12700" cap="flat" cmpd="sng" algn="ctr">
                       <a:solidFill>
                         <a:srgbClr val="444444"/>
                       </a:solidFill>
                       <a:prstDash val="solid"/>
+                      <a:round/>
+                      <a:headEnd type="none" w="med" len="med"/>
+                      <a:tailEnd type="none" w="med" len="med"/>
                     </a:lnR>
                     <a:lnT w="12700" cap="flat" cmpd="sng" algn="ctr">
                       <a:solidFill>
                         <a:srgbClr val="444444"/>
                       </a:solidFill>
                       <a:prstDash val="solid"/>
+                      <a:round/>
+                      <a:headEnd type="none" w="med" len="med"/>
+                      <a:tailEnd type="none" w="med" len="med"/>
                     </a:lnT>
                     <a:lnB w="12700" cap="flat" cmpd="sng" algn="ctr">
                       <a:solidFill>
                         <a:srgbClr val="444444"/>
                       </a:solidFill>
                       <a:prstDash val="solid"/>
+                      <a:round/>
+                      <a:headEnd type="none" w="med" len="med"/>
+                      <a:tailEnd type="none" w="med" len="med"/>
                     </a:lnB>
+                    <a:solidFill>
+                      <a:srgbClr val="FFFFFF"/>
+                    </a:solidFill>
                   </a:tcPr>
                 </a:tc>
                 <a:tc>
@@ -3673,33 +3781,45 @@
                     </a:p>
                   </a:txBody>
                   <a:tcPr anchor="ctr">
-                    <a:solidFill>
-                      <a:srgbClr val="FFFFFF"/>
-                    </a:solidFill>
                     <a:lnL w="12700" cap="flat" cmpd="sng" algn="ctr">
                       <a:solidFill>
                         <a:srgbClr val="444444"/>
                       </a:solidFill>
                       <a:prstDash val="solid"/>
+                      <a:round/>
+                      <a:headEnd type="none" w="med" len="med"/>
+                      <a:tailEnd type="none" w="med" len="med"/>
                     </a:lnL>
                     <a:lnR w="12700" cap="flat" cmpd="sng" algn="ctr">
                       <a:solidFill>
                         <a:srgbClr val="444444"/>
                       </a:solidFill>
                       <a:prstDash val="solid"/>
+                      <a:round/>
+                      <a:headEnd type="none" w="med" len="med"/>
+                      <a:tailEnd type="none" w="med" len="med"/>
                     </a:lnR>
                     <a:lnT w="12700" cap="flat" cmpd="sng" algn="ctr">
                       <a:solidFill>
                         <a:srgbClr val="444444"/>
                       </a:solidFill>
                       <a:prstDash val="solid"/>
+                      <a:round/>
+                      <a:headEnd type="none" w="med" len="med"/>
+                      <a:tailEnd type="none" w="med" len="med"/>
                     </a:lnT>
                     <a:lnB w="12700" cap="flat" cmpd="sng" algn="ctr">
                       <a:solidFill>
                         <a:srgbClr val="444444"/>
                       </a:solidFill>
                       <a:prstDash val="solid"/>
+                      <a:round/>
+                      <a:headEnd type="none" w="med" len="med"/>
+                      <a:tailEnd type="none" w="med" len="med"/>
                     </a:lnB>
+                    <a:solidFill>
+                      <a:srgbClr val="FFFFFF"/>
+                    </a:solidFill>
                   </a:tcPr>
                 </a:tc>
               </a:tr>

</xml_diff>

<commit_message>
dev static class WorkBookFeature and test for func get_WWAN_ID
</commit_message>
<xml_diff>
--- a/pptx/result/tmp.pptx
+++ b/pptx/result/tmp.pptx
@@ -3546,6 +3546,14 @@
                   <a:txBody>
                     <a:bodyPr/>
                     <a:lstStyle/>
+                    <a:p>
+                      <a:pPr algn="ctr">
+                        <a:defRPr sz="1000"/>
+                      </a:pPr>
+                      <a:r>
+                        <a:t>T77W968</a:t>
+                      </a:r>
+                    </a:p>
                     <a:p>
                       <a:pPr algn="ctr">
                         <a:defRPr sz="1000"/>

</xml_diff>